<commit_message>
fixed 'portfolio value' plot, cleaned code for final submission
</commit_message>
<xml_diff>
--- a/Project_1_presentation.pptx
+++ b/Project_1_presentation.pptx
@@ -6,12 +6,11 @@
   </p:sldMasterIdLst>
   <p:sldIdLst>
     <p:sldId id="256" r:id="rId2"/>
-    <p:sldId id="257" r:id="rId3"/>
-    <p:sldId id="258" r:id="rId4"/>
-    <p:sldId id="259" r:id="rId5"/>
-    <p:sldId id="260" r:id="rId6"/>
-    <p:sldId id="261" r:id="rId7"/>
-    <p:sldId id="262" r:id="rId8"/>
+    <p:sldId id="258" r:id="rId3"/>
+    <p:sldId id="259" r:id="rId4"/>
+    <p:sldId id="260" r:id="rId5"/>
+    <p:sldId id="261" r:id="rId6"/>
+    <p:sldId id="262" r:id="rId7"/>
   </p:sldIdLst>
   <p:sldSz cx="12192000" cy="6858000"/>
   <p:notesSz cx="6858000" cy="9144000"/>
@@ -3431,7 +3430,7 @@
           <p:cNvPr id="2" name="Title 1">
             <a:extLst>
               <a:ext uri="{FF2B5EF4-FFF2-40B4-BE49-F238E27FC236}">
-                <a16:creationId xmlns:a16="http://schemas.microsoft.com/office/drawing/2014/main" id="{BE2D4D1F-5877-46FF-C2EC-C21A81FFFD76}"/>
+                <a16:creationId xmlns:a16="http://schemas.microsoft.com/office/drawing/2014/main" id="{D1176713-2BD3-E1F9-47DA-B1D069A8F0FE}"/>
               </a:ext>
             </a:extLst>
           </p:cNvPr>
@@ -3447,7 +3446,10 @@
           <a:bodyPr/>
           <a:lstStyle/>
           <a:p>
-            <a:endParaRPr lang="en-US"/>
+            <a:r>
+              <a:rPr lang="en-US" dirty="0"/>
+              <a:t>Project Summary</a:t>
+            </a:r>
           </a:p>
         </p:txBody>
       </p:sp>
@@ -3456,7 +3458,7 @@
           <p:cNvPr id="3" name="Content Placeholder 2">
             <a:extLst>
               <a:ext uri="{FF2B5EF4-FFF2-40B4-BE49-F238E27FC236}">
-                <a16:creationId xmlns:a16="http://schemas.microsoft.com/office/drawing/2014/main" id="{52B635BA-E49F-C306-FA15-8A1D72FFE2CF}"/>
+                <a16:creationId xmlns:a16="http://schemas.microsoft.com/office/drawing/2014/main" id="{30F4372C-1F3A-EF6B-D59D-E58493A10BE8}"/>
               </a:ext>
             </a:extLst>
           </p:cNvPr>
@@ -3470,123 +3472,45 @@
         <p:spPr/>
         <p:txBody>
           <a:bodyPr>
-            <a:normAutofit fontScale="55000" lnSpcReduction="20000"/>
+            <a:normAutofit fontScale="62500" lnSpcReduction="20000"/>
           </a:bodyPr>
           <a:lstStyle/>
           <a:p>
             <a:r>
               <a:rPr lang="en-US" dirty="0"/>
-              <a:t>The presentation requirements for Project 1 are as follows.</a:t>
-            </a:r>
-          </a:p>
-          <a:p>
-            <a:r>
-              <a:rPr lang="en-US" dirty="0"/>
-              <a:t>Each project group will prepare a formal, 10-minute presentation that covers:</a:t>
-            </a:r>
-          </a:p>
-          <a:p>
-            <a:r>
-              <a:rPr lang="en-US" dirty="0"/>
-              <a:t>An executive summary/overview of the project and project goals.</a:t>
-            </a:r>
-          </a:p>
-          <a:p>
-            <a:pPr lvl="1"/>
-            <a:r>
-              <a:rPr lang="en-US" dirty="0"/>
-              <a:t>Be sure to explain how this project relates to FinTech and Financial Programming.</a:t>
-            </a:r>
-          </a:p>
-          <a:p>
-            <a:r>
-              <a:rPr lang="en-US" dirty="0"/>
-              <a:t>Data Collection, Cleanup &amp; Exploration</a:t>
-            </a:r>
-          </a:p>
-          <a:p>
-            <a:pPr lvl="1"/>
-            <a:r>
-              <a:rPr lang="en-US" dirty="0"/>
-              <a:t>Describe the source of your data and why you chose it for your project.</a:t>
-            </a:r>
-          </a:p>
-          <a:p>
-            <a:pPr lvl="1"/>
-            <a:r>
-              <a:rPr lang="en-US" dirty="0"/>
-              <a:t>Describe the collection, exploration, and cleanup process.</a:t>
-            </a:r>
-          </a:p>
-          <a:p>
-            <a:r>
-              <a:rPr lang="en-US" dirty="0"/>
-              <a:t>The approach that your group took in achieving the project goals.</a:t>
-            </a:r>
-          </a:p>
-          <a:p>
-            <a:pPr lvl="1"/>
-            <a:r>
-              <a:rPr lang="en-US" dirty="0"/>
-              <a:t>Include any relevant code or demonstrations of the financial application or analysis.</a:t>
-            </a:r>
-          </a:p>
-          <a:p>
-            <a:pPr lvl="1"/>
-            <a:r>
-              <a:rPr lang="en-US" dirty="0"/>
-              <a:t>Discuss any unanticipated insights or problems that arose and how you resolved them.</a:t>
-            </a:r>
-          </a:p>
-          <a:p>
-            <a:r>
-              <a:rPr lang="en-US" dirty="0"/>
-              <a:t>The results/conclusions of the financial application or analysis.</a:t>
-            </a:r>
-          </a:p>
-          <a:p>
-            <a:pPr lvl="1"/>
-            <a:r>
-              <a:rPr lang="en-US" dirty="0"/>
-              <a:t>Be sure to include relevant images or examples to support your work.</a:t>
-            </a:r>
-          </a:p>
-          <a:p>
-            <a:pPr lvl="1"/>
-            <a:r>
-              <a:rPr lang="en-US" dirty="0"/>
-              <a:t>If the project goal was not achieved, talk about the issues and what was attempted to resolve the issues.</a:t>
-            </a:r>
-          </a:p>
-          <a:p>
-            <a:r>
-              <a:rPr lang="en-US" dirty="0"/>
-              <a:t>Next Steps.</a:t>
-            </a:r>
-          </a:p>
-          <a:p>
-            <a:pPr lvl="1"/>
-            <a:r>
-              <a:rPr lang="en-US" dirty="0"/>
-              <a:t>Take a moment to discuss potential next steps for the project.</a:t>
-            </a:r>
-          </a:p>
-          <a:p>
-            <a:pPr lvl="1"/>
-            <a:r>
-              <a:rPr lang="en-US" dirty="0"/>
-              <a:t>Discuss any additional questions that came up that you didn't have time to answer: if you had more weeks to work on your project, what would you research next?</a:t>
-            </a:r>
-          </a:p>
-          <a:p>
-            <a:endParaRPr lang="en-US" dirty="0"/>
+              <a:t>This project consists of a portfolio analyzer application, as well as an analysis of the major indexes.</a:t>
+            </a:r>
+          </a:p>
+          <a:p>
+            <a:r>
+              <a:rPr lang="en-US" dirty="0"/>
+              <a:t>For the application portion, the user can select five unique stocks or bonds to add to a portfolio that is saved to a .csv file.  The user can then input the quantity owned, and it will plot the value of their portfolio over time, as well as generate summary statistics.  The returns of the stocks/bonds are then overlayed on a plot so the user can see all of the charts.</a:t>
+            </a:r>
+          </a:p>
+          <a:p>
+            <a:r>
+              <a:rPr lang="en-US" dirty="0"/>
+              <a:t>For the analysis portion, the user’s portfolio as well as a portfolio of the major indexes are run through a ten-year Monte Carlo simulation to analyze possible future moves.  Using the upper and lower confidence intervals, the application determines whether or not the portfolio has a likelihood to be profitable.</a:t>
+            </a:r>
+          </a:p>
+          <a:p>
+            <a:r>
+              <a:rPr lang="en-US" dirty="0"/>
+              <a:t>The goal of the project was to create a complete portfolio analyzer that gave the user all the information they might need to make financial decisions, as well as to analyze the stock market as a whole and determine if the current bear market had a likelihood to last long into the future.</a:t>
+            </a:r>
+          </a:p>
+          <a:p>
+            <a:r>
+              <a:rPr lang="en-US" dirty="0"/>
+              <a:t>I would like to include other features such as risk-return analytics so the user has a more complete view of their situation.  I want to get data for the indexes from the last 20 years as well as the last 50 years so the prediction can be more accurate and so I could analyze just how drastically different the outcomes would be.  I would be interested to see how the amount of data changes the simulation.  I would also like to modularize the application so it is more visually pleasing to the user.</a:t>
+            </a:r>
           </a:p>
         </p:txBody>
       </p:sp>
     </p:spTree>
     <p:extLst>
       <p:ext uri="{BB962C8B-B14F-4D97-AF65-F5344CB8AC3E}">
-        <p14:creationId xmlns:p14="http://schemas.microsoft.com/office/powerpoint/2010/main" val="2875466390"/>
+        <p14:creationId xmlns:p14="http://schemas.microsoft.com/office/powerpoint/2010/main" val="2955819900"/>
       </p:ext>
     </p:extLst>
   </p:cSld>
@@ -3618,7 +3542,7 @@
           <p:cNvPr id="2" name="Title 1">
             <a:extLst>
               <a:ext uri="{FF2B5EF4-FFF2-40B4-BE49-F238E27FC236}">
-                <a16:creationId xmlns:a16="http://schemas.microsoft.com/office/drawing/2014/main" id="{D1176713-2BD3-E1F9-47DA-B1D069A8F0FE}"/>
+                <a16:creationId xmlns:a16="http://schemas.microsoft.com/office/drawing/2014/main" id="{AE930232-F50A-F528-A48D-6E47BBAED0BB}"/>
               </a:ext>
             </a:extLst>
           </p:cNvPr>
@@ -3636,7 +3560,7 @@
           <a:p>
             <a:r>
               <a:rPr lang="en-US" dirty="0"/>
-              <a:t>Project Summary</a:t>
+              <a:t>Data Collection, Cleanup, and Exploration</a:t>
             </a:r>
           </a:p>
         </p:txBody>
@@ -3646,7 +3570,7 @@
           <p:cNvPr id="3" name="Content Placeholder 2">
             <a:extLst>
               <a:ext uri="{FF2B5EF4-FFF2-40B4-BE49-F238E27FC236}">
-                <a16:creationId xmlns:a16="http://schemas.microsoft.com/office/drawing/2014/main" id="{30F4372C-1F3A-EF6B-D59D-E58493A10BE8}"/>
+                <a16:creationId xmlns:a16="http://schemas.microsoft.com/office/drawing/2014/main" id="{7FED4E0D-8538-C527-37A6-36F4FFAD622A}"/>
               </a:ext>
             </a:extLst>
           </p:cNvPr>
@@ -3660,45 +3584,69 @@
         <p:spPr/>
         <p:txBody>
           <a:bodyPr>
-            <a:normAutofit fontScale="62500" lnSpcReduction="20000"/>
+            <a:normAutofit fontScale="77500" lnSpcReduction="20000"/>
           </a:bodyPr>
           <a:lstStyle/>
           <a:p>
             <a:r>
               <a:rPr lang="en-US" dirty="0"/>
-              <a:t>This project consists of a portfolio analyzer application, as well as an analysis of the major indexes.</a:t>
-            </a:r>
-          </a:p>
-          <a:p>
-            <a:r>
-              <a:rPr lang="en-US" dirty="0"/>
-              <a:t>For the application portion, the user can select five unique stocks or bonds to add to a portfolio that is saved to a .csv file.  The user can then input the quantity owned, and it will plot the value of their portfolio over time, as well as generate summary statistics.  The returns of the stocks/bonds are then overlayed on a plot so the user can see all of the charts.</a:t>
-            </a:r>
-          </a:p>
-          <a:p>
-            <a:r>
-              <a:rPr lang="en-US" dirty="0"/>
-              <a:t>For the analysis portion, the user’s portfolio as well as a portfolio of the major indexes are run through a ten-year Monte Carlo simulation to analyze possible future moves.  Using the upper and lower confidence intervals, the application determines whether or not the portfolio has a likelihood to be profitable.</a:t>
-            </a:r>
-          </a:p>
-          <a:p>
-            <a:r>
-              <a:rPr lang="en-US" dirty="0"/>
-              <a:t>The goal of the project was to create a complete portfolio analyzer that gave the user all the information they might need to make financial decisions, as well as to analyze the stock market as a whole and determine if the current bear market had a likelihood to last long into the future.</a:t>
-            </a:r>
-          </a:p>
-          <a:p>
-            <a:r>
-              <a:rPr lang="en-US" dirty="0"/>
-              <a:t>I would like to include other features such as risk-return analytics so the user has a more complete view of their situation.  I want to get data for the indexes from the last 20 years as well as the last 50 years so the prediction can be more accurate and so I could analyze just how drastically different the outcomes would be.  I would be interested to see how the amount of data changes the simulation.  I would also like to modularize the application so it is more visually pleasing to the user.</a:t>
-            </a:r>
+              <a:t>There were different sources for the data I gathered; I used the Alpacas API to gather stock data and .csv files from </a:t>
+            </a:r>
+            <a:r>
+              <a:rPr lang="en-US" dirty="0" err="1"/>
+              <a:t>Marketwatch</a:t>
+            </a:r>
+            <a:r>
+              <a:rPr lang="en-US" dirty="0"/>
+              <a:t>/Yahoo Finance for the index data.  I chose Alpacas because I thought using an API would be the best way for a user to choose their own tickers to input without having to create a database that wouldn’t even be complete.  I used the .csv files only because Alpacas doesn’t offer index data.</a:t>
+            </a:r>
+          </a:p>
+          <a:p>
+            <a:r>
+              <a:rPr lang="en-US" dirty="0"/>
+              <a:t>The data collection was somewhat difficult at first, as Alpacas didn’t offer the data I wanted.  I went to numerous different sites that offer historical data, but many of them do not offer more than one year for the indexes.  I wanted at least 5 years of data for the simulation, so I had to be very picky.  I finally came across </a:t>
+            </a:r>
+            <a:r>
+              <a:rPr lang="en-US" dirty="0" err="1"/>
+              <a:t>Marketwatch</a:t>
+            </a:r>
+            <a:r>
+              <a:rPr lang="en-US" dirty="0"/>
+              <a:t>, where historical data is stored and users can download as far back as they wish.</a:t>
+            </a:r>
+          </a:p>
+          <a:p>
+            <a:r>
+              <a:rPr lang="en-US" dirty="0"/>
+              <a:t>I didn’t have to do much exploring of the data because it was all fairly straightforward, but </a:t>
+            </a:r>
+          </a:p>
+          <a:p>
+            <a:r>
+              <a:rPr lang="en-US" dirty="0"/>
+              <a:t>Cleaning the data was fairly easy, but adding in the index data complicated it a bit.  The </a:t>
+            </a:r>
+            <a:r>
+              <a:rPr lang="en-US" dirty="0" err="1"/>
+              <a:t>DataFrames</a:t>
+            </a:r>
+            <a:r>
+              <a:rPr lang="en-US" dirty="0"/>
+              <a:t> had different column names and special characters for each separate value, so when cleaning the data I had to write unique code for both the API data and the index data.</a:t>
+            </a:r>
+          </a:p>
+          <a:p>
+            <a:endParaRPr lang="en-US" dirty="0"/>
+          </a:p>
+          <a:p>
+            <a:endParaRPr lang="en-US" dirty="0"/>
           </a:p>
         </p:txBody>
       </p:sp>
     </p:spTree>
     <p:extLst>
       <p:ext uri="{BB962C8B-B14F-4D97-AF65-F5344CB8AC3E}">
-        <p14:creationId xmlns:p14="http://schemas.microsoft.com/office/powerpoint/2010/main" val="2955819900"/>
+        <p14:creationId xmlns:p14="http://schemas.microsoft.com/office/powerpoint/2010/main" val="3983996054"/>
       </p:ext>
     </p:extLst>
   </p:cSld>
@@ -3730,7 +3678,7 @@
           <p:cNvPr id="2" name="Title 1">
             <a:extLst>
               <a:ext uri="{FF2B5EF4-FFF2-40B4-BE49-F238E27FC236}">
-                <a16:creationId xmlns:a16="http://schemas.microsoft.com/office/drawing/2014/main" id="{AE930232-F50A-F528-A48D-6E47BBAED0BB}"/>
+                <a16:creationId xmlns:a16="http://schemas.microsoft.com/office/drawing/2014/main" id="{2529DC68-14D2-FF32-0231-0F08D3A1FDC8}"/>
               </a:ext>
             </a:extLst>
           </p:cNvPr>
@@ -3748,7 +3696,7 @@
           <a:p>
             <a:r>
               <a:rPr lang="en-US" dirty="0"/>
-              <a:t>Data Collection, Cleanup, and Exploration</a:t>
+              <a:t>Project Approach</a:t>
             </a:r>
           </a:p>
         </p:txBody>
@@ -3758,7 +3706,7 @@
           <p:cNvPr id="3" name="Content Placeholder 2">
             <a:extLst>
               <a:ext uri="{FF2B5EF4-FFF2-40B4-BE49-F238E27FC236}">
-                <a16:creationId xmlns:a16="http://schemas.microsoft.com/office/drawing/2014/main" id="{7FED4E0D-8538-C527-37A6-36F4FFAD622A}"/>
+                <a16:creationId xmlns:a16="http://schemas.microsoft.com/office/drawing/2014/main" id="{353ED900-754C-0228-5049-CEA24AF05FC9}"/>
               </a:ext>
             </a:extLst>
           </p:cNvPr>
@@ -3772,47 +3720,19 @@
         <p:spPr/>
         <p:txBody>
           <a:bodyPr>
-            <a:normAutofit fontScale="77500" lnSpcReduction="20000"/>
+            <a:normAutofit fontScale="62500" lnSpcReduction="20000"/>
           </a:bodyPr>
           <a:lstStyle/>
           <a:p>
             <a:r>
               <a:rPr lang="en-US" dirty="0"/>
-              <a:t>There were different sources for the data I gathered; I used the Alpacas API to gather stock data and .csv files from </a:t>
-            </a:r>
-            <a:r>
-              <a:rPr lang="en-US" dirty="0" err="1"/>
-              <a:t>Marketwatch</a:t>
-            </a:r>
-            <a:r>
-              <a:rPr lang="en-US" dirty="0"/>
-              <a:t>/Yahoo Finance for the index data.  I chose Alpacas because I thought using an API would be the best way for a user to choose their own tickers to input without having to create a database that wouldn’t even be complete.  I used the .csv files only because Alpacas doesn’t offer index data.</a:t>
-            </a:r>
-          </a:p>
-          <a:p>
-            <a:r>
-              <a:rPr lang="en-US" dirty="0"/>
-              <a:t>The data collection was somewhat difficult at first, as Alpacas didn’t offer the data I wanted.  I went to numerous different sites that offer historical data, but many of them do not offer more than one year for the indexes.  I wanted at least 5 years of data for the simulation, so I had to be very picky.  I finally came across </a:t>
-            </a:r>
-            <a:r>
-              <a:rPr lang="en-US" dirty="0" err="1"/>
-              <a:t>Marketwatch</a:t>
-            </a:r>
-            <a:r>
-              <a:rPr lang="en-US" dirty="0"/>
-              <a:t>, where historical data is stored and users can download as far back as they wish.</a:t>
-            </a:r>
-          </a:p>
-          <a:p>
-            <a:r>
-              <a:rPr lang="en-US" dirty="0"/>
-              <a:t>I didn’t have to do much exploring of the data because it was all fairly straightforward, but </a:t>
-            </a:r>
-          </a:p>
-          <a:p>
-            <a:r>
-              <a:rPr lang="en-US" dirty="0"/>
-              <a:t>Cleaning the data was fairly easy, but adding in the index data complicated it a bit.  The </a:t>
+              <a:t>The project was born out of a desire to utilize the Alpacas API and have user selection.  Initially, it was just going to be a portfolio analyzer that gave detailed information about the user’s selected tickers (along with business information if I had time), but I decided to also analyze the market as a whole, given that this year has marked the end of the bull run from the last couple of years.</a:t>
+            </a:r>
+          </a:p>
+          <a:p>
+            <a:r>
+              <a:rPr lang="en-US" dirty="0"/>
+              <a:t>I did not expect locating the data to be so difficult.  The data from the API was bad at first, and I had to modify the </a:t>
             </a:r>
             <a:r>
               <a:rPr lang="en-US" dirty="0" err="1"/>
@@ -3820,11 +3740,66 @@
             </a:r>
             <a:r>
               <a:rPr lang="en-US" dirty="0"/>
-              <a:t> had different column names and special characters for each separate value, so when cleaning the data I had to write unique code for both the API data and the index data.</a:t>
-            </a:r>
-          </a:p>
-          <a:p>
-            <a:endParaRPr lang="en-US" dirty="0"/>
+              <a:t> using the .</a:t>
+            </a:r>
+            <a:r>
+              <a:rPr lang="en-US" dirty="0" err="1"/>
+              <a:t>pivot_table</a:t>
+            </a:r>
+            <a:r>
+              <a:rPr lang="en-US" dirty="0"/>
+              <a:t>() function.  My original approach for having user input did not work, either.  I tried using the questionary library, but even after creating new dev environments, I could not get it to work with </a:t>
+            </a:r>
+            <a:r>
+              <a:rPr lang="en-US" dirty="0" err="1"/>
+              <a:t>Jupyter</a:t>
+            </a:r>
+            <a:r>
+              <a:rPr lang="en-US" dirty="0"/>
+              <a:t> Lab.  With more time, I think I would have preferred questionary.</a:t>
+            </a:r>
+          </a:p>
+          <a:p>
+            <a:r>
+              <a:rPr lang="en-US" dirty="0"/>
+              <a:t>I had to search a few different methods for data cleanup, as well as </a:t>
+            </a:r>
+            <a:r>
+              <a:rPr lang="en-US" dirty="0" err="1"/>
+              <a:t>DataFrame</a:t>
+            </a:r>
+            <a:r>
+              <a:rPr lang="en-US" dirty="0"/>
+              <a:t> manipulation (such as .squeeze).  What we learned in the modules wasn’t enough to get the stock data working, so I had to scour the internet for solutions.</a:t>
+            </a:r>
+          </a:p>
+          <a:p>
+            <a:r>
+              <a:rPr lang="en-US" dirty="0"/>
+              <a:t>I had some issues initially while attempting to create a forked branch on GitHub.  My first time doing it, it erased all of my files because I accidentally git pulled what was in the forked branch (a readme and the empty .</a:t>
+            </a:r>
+            <a:r>
+              <a:rPr lang="en-US" dirty="0" err="1"/>
+              <a:t>ipynb</a:t>
+            </a:r>
+            <a:r>
+              <a:rPr lang="en-US" dirty="0"/>
+              <a:t> file) into Main.  I’m still not entirely sure how I did it…  Luckily I had the project saved in a second location because I’m paranoid, otherwise I would have lost a lot of work.</a:t>
+            </a:r>
+          </a:p>
+          <a:p>
+            <a:r>
+              <a:rPr lang="en-US" dirty="0"/>
+              <a:t>I was very surprised by the </a:t>
+            </a:r>
+            <a:r>
+              <a:rPr lang="en-US" dirty="0" err="1"/>
+              <a:t>MCSim</a:t>
+            </a:r>
+            <a:r>
+              <a:rPr lang="en-US" dirty="0"/>
+              <a:t> of the indexes.  I expected with half of the data being from a bull run, the simulation would predict major gains.  It was just the opposite, however, with the portfolio expecting losses or very little gains.</a:t>
+            </a:r>
           </a:p>
           <a:p>
             <a:endParaRPr lang="en-US" dirty="0"/>
@@ -3834,7 +3809,7 @@
     </p:spTree>
     <p:extLst>
       <p:ext uri="{BB962C8B-B14F-4D97-AF65-F5344CB8AC3E}">
-        <p14:creationId xmlns:p14="http://schemas.microsoft.com/office/powerpoint/2010/main" val="3983996054"/>
+        <p14:creationId xmlns:p14="http://schemas.microsoft.com/office/powerpoint/2010/main" val="2885655626"/>
       </p:ext>
     </p:extLst>
   </p:cSld>
@@ -3866,174 +3841,6 @@
           <p:cNvPr id="2" name="Title 1">
             <a:extLst>
               <a:ext uri="{FF2B5EF4-FFF2-40B4-BE49-F238E27FC236}">
-                <a16:creationId xmlns:a16="http://schemas.microsoft.com/office/drawing/2014/main" id="{2529DC68-14D2-FF32-0231-0F08D3A1FDC8}"/>
-              </a:ext>
-            </a:extLst>
-          </p:cNvPr>
-          <p:cNvSpPr>
-            <a:spLocks noGrp="1"/>
-          </p:cNvSpPr>
-          <p:nvPr>
-            <p:ph type="title"/>
-          </p:nvPr>
-        </p:nvSpPr>
-        <p:spPr/>
-        <p:txBody>
-          <a:bodyPr/>
-          <a:lstStyle/>
-          <a:p>
-            <a:r>
-              <a:rPr lang="en-US" dirty="0"/>
-              <a:t>Project Approach</a:t>
-            </a:r>
-          </a:p>
-        </p:txBody>
-      </p:sp>
-      <p:sp>
-        <p:nvSpPr>
-          <p:cNvPr id="3" name="Content Placeholder 2">
-            <a:extLst>
-              <a:ext uri="{FF2B5EF4-FFF2-40B4-BE49-F238E27FC236}">
-                <a16:creationId xmlns:a16="http://schemas.microsoft.com/office/drawing/2014/main" id="{353ED900-754C-0228-5049-CEA24AF05FC9}"/>
-              </a:ext>
-            </a:extLst>
-          </p:cNvPr>
-          <p:cNvSpPr>
-            <a:spLocks noGrp="1"/>
-          </p:cNvSpPr>
-          <p:nvPr>
-            <p:ph idx="1"/>
-          </p:nvPr>
-        </p:nvSpPr>
-        <p:spPr/>
-        <p:txBody>
-          <a:bodyPr>
-            <a:normAutofit fontScale="62500" lnSpcReduction="20000"/>
-          </a:bodyPr>
-          <a:lstStyle/>
-          <a:p>
-            <a:r>
-              <a:rPr lang="en-US" dirty="0"/>
-              <a:t>The project was born out of a desire to utilize the Alpacas API and have user selection.  Initially, it was just going to be a portfolio analyzer that gave detailed information about the user’s selected tickers (along with business information if I had time), but I decided to also analyze the market as a whole, given that this year has marked the end of the bull run from the last couple of years.</a:t>
-            </a:r>
-          </a:p>
-          <a:p>
-            <a:r>
-              <a:rPr lang="en-US" dirty="0"/>
-              <a:t>I did not expect locating the data to be so difficult.  The data from the API was bad at first, and I had to modify the </a:t>
-            </a:r>
-            <a:r>
-              <a:rPr lang="en-US" dirty="0" err="1"/>
-              <a:t>DataFrames</a:t>
-            </a:r>
-            <a:r>
-              <a:rPr lang="en-US" dirty="0"/>
-              <a:t> using the .</a:t>
-            </a:r>
-            <a:r>
-              <a:rPr lang="en-US" dirty="0" err="1"/>
-              <a:t>pivot_table</a:t>
-            </a:r>
-            <a:r>
-              <a:rPr lang="en-US" dirty="0"/>
-              <a:t>() function.  My original approach for having user input did not work, either.  I tried using the questionary library, but even after creating new dev environments, I could not get it to work with </a:t>
-            </a:r>
-            <a:r>
-              <a:rPr lang="en-US" dirty="0" err="1"/>
-              <a:t>Jupyter</a:t>
-            </a:r>
-            <a:r>
-              <a:rPr lang="en-US" dirty="0"/>
-              <a:t> Lab.  With more time, I think I would have preferred questionary.</a:t>
-            </a:r>
-          </a:p>
-          <a:p>
-            <a:r>
-              <a:rPr lang="en-US" dirty="0"/>
-              <a:t>I had to search a few different methods for data cleanup, as well as </a:t>
-            </a:r>
-            <a:r>
-              <a:rPr lang="en-US" dirty="0" err="1"/>
-              <a:t>DataFrame</a:t>
-            </a:r>
-            <a:r>
-              <a:rPr lang="en-US" dirty="0"/>
-              <a:t> manipulation (such as .squeeze).  What we learned in the modules wasn’t enough to get the stock data working, so I had to scour the internet for solutions.</a:t>
-            </a:r>
-          </a:p>
-          <a:p>
-            <a:r>
-              <a:rPr lang="en-US" dirty="0"/>
-              <a:t>I had some issues initially while attempting to create a forked branch on GitHub.  My first time doing it, it erased all of my files because I accidentally git pulled what was in the forked branch (a readme and the empty .</a:t>
-            </a:r>
-            <a:r>
-              <a:rPr lang="en-US" dirty="0" err="1"/>
-              <a:t>ipynb</a:t>
-            </a:r>
-            <a:r>
-              <a:rPr lang="en-US" dirty="0"/>
-              <a:t> file) into Main.  I’m still not entirely sure how I did it…  Luckily I had the project saved in a second location because I’m paranoid, otherwise I would have lost a lot of work.</a:t>
-            </a:r>
-          </a:p>
-          <a:p>
-            <a:r>
-              <a:rPr lang="en-US" dirty="0"/>
-              <a:t>I was very surprised by the </a:t>
-            </a:r>
-            <a:r>
-              <a:rPr lang="en-US" dirty="0" err="1"/>
-              <a:t>MCSim</a:t>
-            </a:r>
-            <a:r>
-              <a:rPr lang="en-US" dirty="0"/>
-              <a:t> of the indexes.  I expected with half of the data being from a bull run, the simulation would predict major gains.  It was just the opposite, however, with the portfolio expecting losses or </a:t>
-            </a:r>
-            <a:r>
-              <a:rPr lang="en-US"/>
-              <a:t>very little gains.</a:t>
-            </a:r>
-            <a:endParaRPr lang="en-US" dirty="0"/>
-          </a:p>
-          <a:p>
-            <a:endParaRPr lang="en-US" dirty="0"/>
-          </a:p>
-        </p:txBody>
-      </p:sp>
-    </p:spTree>
-    <p:extLst>
-      <p:ext uri="{BB962C8B-B14F-4D97-AF65-F5344CB8AC3E}">
-        <p14:creationId xmlns:p14="http://schemas.microsoft.com/office/powerpoint/2010/main" val="2885655626"/>
-      </p:ext>
-    </p:extLst>
-  </p:cSld>
-  <p:clrMapOvr>
-    <a:masterClrMapping/>
-  </p:clrMapOvr>
-</p:sld>
-</file>
-
-<file path=ppt/slides/slide6.xml><?xml version="1.0" encoding="utf-8"?>
-<p:sld xmlns:a="http://schemas.openxmlformats.org/drawingml/2006/main" xmlns:r="http://schemas.openxmlformats.org/officeDocument/2006/relationships" xmlns:p="http://schemas.openxmlformats.org/presentationml/2006/main">
-  <p:cSld>
-    <p:spTree>
-      <p:nvGrpSpPr>
-        <p:cNvPr id="1" name=""/>
-        <p:cNvGrpSpPr/>
-        <p:nvPr/>
-      </p:nvGrpSpPr>
-      <p:grpSpPr>
-        <a:xfrm>
-          <a:off x="0" y="0"/>
-          <a:ext cx="0" cy="0"/>
-          <a:chOff x="0" y="0"/>
-          <a:chExt cx="0" cy="0"/>
-        </a:xfrm>
-      </p:grpSpPr>
-      <p:sp>
-        <p:nvSpPr>
-          <p:cNvPr id="2" name="Title 1">
-            <a:extLst>
-              <a:ext uri="{FF2B5EF4-FFF2-40B4-BE49-F238E27FC236}">
                 <a16:creationId xmlns:a16="http://schemas.microsoft.com/office/drawing/2014/main" id="{0743E30B-8218-297B-7B85-6539E56E3D3E}"/>
               </a:ext>
             </a:extLst>
@@ -4113,13 +3920,13 @@
             </a:r>
             <a:r>
               <a:rPr lang="en-US" dirty="0"/>
-              <a:t>), I had to do a lot of tweaking to the data types and the columns/column names to get them to work properly.</a:t>
-            </a:r>
-          </a:p>
-          <a:p>
-            <a:r>
-              <a:rPr lang="en-US" dirty="0"/>
-              <a:t>I also wanted to do further analysis on the market as a whole, because this year marked the end of the bull run from the last couple years, and I would have liked to make more predictions or drill down a bit more into the analysis; </a:t>
+              <a:t>), I had to do a lot of tweaking to the data types and the column values/names to get them to work properly.</a:t>
+            </a:r>
+          </a:p>
+          <a:p>
+            <a:r>
+              <a:rPr lang="en-US" dirty="0"/>
+              <a:t>I also wanted to do further analysis on the market as a whole, because this year marked the end of the bull run from the last couple years, and I would have liked to make more predictions or drill down a bit more into the analysis.  For example, </a:t>
             </a:r>
             <a:r>
               <a:rPr lang="en-US" i="1" dirty="0"/>
@@ -4127,7 +3934,7 @@
             </a:r>
             <a:r>
               <a:rPr lang="en-US" dirty="0"/>
-              <a:t> did the bull market end?  Was it because of COVID and supply chain issues?  Inflation fears?  Banks and funds over-leveraging?  Civil/international unrest?  It’s likely a combination of all of these, and if I had more time, I would love to create a more in-depth analysis.</a:t>
+              <a:t> did the bull market end?  What factors played a part?  Was it because of COVID and supply chain issues?  Inflation fears?  Banks and funds over-leveraging?  Civil/international unrest?  It’s likely a combination of all of these, and if I had more time, I would love to create a more in-depth analysis.</a:t>
             </a:r>
           </a:p>
           <a:p>
@@ -4177,7 +3984,7 @@
 </p:sld>
 </file>
 
-<file path=ppt/slides/slide7.xml><?xml version="1.0" encoding="utf-8"?>
+<file path=ppt/slides/slide6.xml><?xml version="1.0" encoding="utf-8"?>
 <p:sld xmlns:a="http://schemas.openxmlformats.org/drawingml/2006/main" xmlns:r="http://schemas.openxmlformats.org/officeDocument/2006/relationships" xmlns:p="http://schemas.openxmlformats.org/presentationml/2006/main">
   <p:cSld>
     <p:spTree>

</xml_diff>